<commit_message>
Implementations for refined (lowercase/error robust/natural samples) training.
</commit_message>
<xml_diff>
--- a/docs/20170926-WG1-KE-FTS_AutoSuggest_DeepSpell.pptx
+++ b/docs/20170926-WG1-KE-FTS_AutoSuggest_DeepSpell.pptx
@@ -5,10 +5,10 @@
     <p:sldMasterId id="2147483648" r:id="rId4"/>
   </p:sldMasterIdLst>
   <p:notesMasterIdLst>
-    <p:notesMasterId r:id="rId16"/>
+    <p:notesMasterId r:id="rId15"/>
   </p:notesMasterIdLst>
   <p:handoutMasterIdLst>
-    <p:handoutMasterId r:id="rId17"/>
+    <p:handoutMasterId r:id="rId16"/>
   </p:handoutMasterIdLst>
   <p:sldIdLst>
     <p:sldId id="291" r:id="rId5"/>
@@ -20,8 +20,7 @@
     <p:sldId id="299" r:id="rId11"/>
     <p:sldId id="301" r:id="rId12"/>
     <p:sldId id="298" r:id="rId13"/>
-    <p:sldId id="302" r:id="rId14"/>
-    <p:sldId id="300" r:id="rId15"/>
+    <p:sldId id="300" r:id="rId14"/>
   </p:sldIdLst>
   <p:sldSz cx="12192000" cy="6858000"/>
   <p:notesSz cx="6858000" cy="9144000"/>
@@ -1412,7 +1411,7 @@
             <a:fld id="{E3F5B1F0-7ABF-4EE9-8DD6-B5678A5E7112}" type="datetimeFigureOut">
               <a:rPr lang="en-US" smtClean="0"/>
               <a:pPr/>
-              <a:t>9/26/17</a:t>
+              <a:t>10/13/17</a:t>
             </a:fld>
             <a:endParaRPr lang="en-US"/>
           </a:p>
@@ -1759,91 +1758,6 @@
     <p:extLst>
       <p:ext uri="{BB962C8B-B14F-4D97-AF65-F5344CB8AC3E}">
         <p14:creationId xmlns:p14="http://schemas.microsoft.com/office/powerpoint/2010/main" val="1967822495"/>
-      </p:ext>
-    </p:extLst>
-  </p:cSld>
-  <p:clrMapOvr>
-    <a:masterClrMapping/>
-  </p:clrMapOvr>
-</p:notes>
-</file>
-
-<file path=ppt/notesSlides/notesSlide2.xml><?xml version="1.0" encoding="utf-8"?>
-<p:notes xmlns:a="http://schemas.openxmlformats.org/drawingml/2006/main" xmlns:r="http://schemas.openxmlformats.org/officeDocument/2006/relationships" xmlns:p="http://schemas.openxmlformats.org/presentationml/2006/main">
-  <p:cSld>
-    <p:spTree>
-      <p:nvGrpSpPr>
-        <p:cNvPr id="1" name=""/>
-        <p:cNvGrpSpPr/>
-        <p:nvPr/>
-      </p:nvGrpSpPr>
-      <p:grpSpPr>
-        <a:xfrm>
-          <a:off x="0" y="0"/>
-          <a:ext cx="0" cy="0"/>
-          <a:chOff x="0" y="0"/>
-          <a:chExt cx="0" cy="0"/>
-        </a:xfrm>
-      </p:grpSpPr>
-      <p:sp>
-        <p:nvSpPr>
-          <p:cNvPr id="2" name="Slide Image Placeholder 1"/>
-          <p:cNvSpPr>
-            <a:spLocks noGrp="1" noRot="1" noChangeAspect="1"/>
-          </p:cNvSpPr>
-          <p:nvPr>
-            <p:ph type="sldImg"/>
-          </p:nvPr>
-        </p:nvSpPr>
-        <p:spPr/>
-      </p:sp>
-      <p:sp>
-        <p:nvSpPr>
-          <p:cNvPr id="3" name="Notes Placeholder 2"/>
-          <p:cNvSpPr>
-            <a:spLocks noGrp="1"/>
-          </p:cNvSpPr>
-          <p:nvPr>
-            <p:ph type="body" idx="1"/>
-          </p:nvPr>
-        </p:nvSpPr>
-        <p:spPr/>
-        <p:txBody>
-          <a:bodyPr/>
-          <a:lstStyle/>
-          <a:p>
-            <a:endParaRPr lang="en-US" dirty="0"/>
-          </a:p>
-        </p:txBody>
-      </p:sp>
-      <p:sp>
-        <p:nvSpPr>
-          <p:cNvPr id="4" name="Slide Number Placeholder 3"/>
-          <p:cNvSpPr>
-            <a:spLocks noGrp="1"/>
-          </p:cNvSpPr>
-          <p:nvPr>
-            <p:ph type="sldNum" sz="quarter" idx="10"/>
-          </p:nvPr>
-        </p:nvSpPr>
-        <p:spPr/>
-        <p:txBody>
-          <a:bodyPr/>
-          <a:lstStyle/>
-          <a:p>
-            <a:fld id="{6F4A5668-264A-4669-A9C0-D9FE6387C595}" type="slidenum">
-              <a:rPr lang="en-US" smtClean="0"/>
-              <a:pPr/>
-              <a:t>10</a:t>
-            </a:fld>
-            <a:endParaRPr lang="en-US"/>
-          </a:p>
-        </p:txBody>
-      </p:sp>
-    </p:spTree>
-    <p:extLst>
-      <p:ext uri="{BB962C8B-B14F-4D97-AF65-F5344CB8AC3E}">
-        <p14:creationId xmlns:p14="http://schemas.microsoft.com/office/powerpoint/2010/main" val="74373654"/>
       </p:ext>
     </p:extLst>
   </p:cSld>
@@ -2189,7 +2103,7 @@
             <a:fld id="{16F67ED1-9E57-4A9D-98F6-3E82101E7E59}" type="datetimeFigureOut">
               <a:rPr lang="en-US" smtClean="0"/>
               <a:pPr/>
-              <a:t>9/26/17</a:t>
+              <a:t>10/13/17</a:t>
             </a:fld>
             <a:endParaRPr lang="en-US"/>
           </a:p>
@@ -3820,7 +3734,7 @@
             <a:fld id="{16F67ED1-9E57-4A9D-98F6-3E82101E7E59}" type="datetimeFigureOut">
               <a:rPr lang="en-US" smtClean="0"/>
               <a:pPr/>
-              <a:t>9/26/17</a:t>
+              <a:t>10/13/17</a:t>
             </a:fld>
             <a:endParaRPr lang="en-US"/>
           </a:p>
@@ -4372,7 +4286,7 @@
             <a:fld id="{16F67ED1-9E57-4A9D-98F6-3E82101E7E59}" type="datetimeFigureOut">
               <a:rPr lang="en-US" smtClean="0"/>
               <a:pPr/>
-              <a:t>9/26/17</a:t>
+              <a:t>10/13/17</a:t>
             </a:fld>
             <a:endParaRPr lang="en-US"/>
           </a:p>
@@ -7533,622 +7447,6 @@
 </file>
 
 <file path=ppt/slides/slide10.xml><?xml version="1.0" encoding="utf-8"?>
-<p:sld xmlns:a="http://schemas.openxmlformats.org/drawingml/2006/main" xmlns:r="http://schemas.openxmlformats.org/officeDocument/2006/relationships" xmlns:p="http://schemas.openxmlformats.org/presentationml/2006/main">
-  <p:cSld>
-    <p:spTree>
-      <p:nvGrpSpPr>
-        <p:cNvPr id="1" name=""/>
-        <p:cNvGrpSpPr/>
-        <p:nvPr/>
-      </p:nvGrpSpPr>
-      <p:grpSpPr>
-        <a:xfrm>
-          <a:off x="0" y="0"/>
-          <a:ext cx="0" cy="0"/>
-          <a:chOff x="0" y="0"/>
-          <a:chExt cx="0" cy="0"/>
-        </a:xfrm>
-      </p:grpSpPr>
-      <p:sp>
-        <p:nvSpPr>
-          <p:cNvPr id="2" name="Textplatzhalter 1">
-            <a:extLst>
-              <a:ext uri="{FF2B5EF4-FFF2-40B4-BE49-F238E27FC236}">
-                <a16:creationId xmlns:a16="http://schemas.microsoft.com/office/drawing/2014/main" xmlns="" id="{9989E324-3E5B-4A1F-9890-05E8D4AEF25C}"/>
-              </a:ext>
-            </a:extLst>
-          </p:cNvPr>
-          <p:cNvSpPr>
-            <a:spLocks noGrp="1"/>
-          </p:cNvSpPr>
-          <p:nvPr>
-            <p:ph type="body" sz="quarter" idx="10"/>
-          </p:nvPr>
-        </p:nvSpPr>
-        <p:spPr/>
-        <p:txBody>
-          <a:bodyPr/>
-          <a:lstStyle/>
-          <a:p>
-            <a:r>
-              <a:rPr lang="de-DE" dirty="0" smtClean="0"/>
-              <a:t>Demonstrator Performance</a:t>
-            </a:r>
-            <a:endParaRPr lang="de-DE" dirty="0"/>
-          </a:p>
-        </p:txBody>
-      </p:sp>
-      <p:sp>
-        <p:nvSpPr>
-          <p:cNvPr id="3" name="Textplatzhalter 2">
-            <a:extLst>
-              <a:ext uri="{FF2B5EF4-FFF2-40B4-BE49-F238E27FC236}">
-                <a16:creationId xmlns:a16="http://schemas.microsoft.com/office/drawing/2014/main" xmlns="" id="{85F1C69B-C33C-43B7-85F0-0DFD899B09A0}"/>
-              </a:ext>
-            </a:extLst>
-          </p:cNvPr>
-          <p:cNvSpPr>
-            <a:spLocks noGrp="1"/>
-          </p:cNvSpPr>
-          <p:nvPr>
-            <p:ph type="body" sz="quarter" idx="12"/>
-          </p:nvPr>
-        </p:nvSpPr>
-        <p:spPr/>
-        <p:txBody>
-          <a:bodyPr/>
-          <a:lstStyle/>
-          <a:p>
-            <a:r>
-              <a:rPr lang="de-DE" dirty="0"/>
-              <a:t>Next </a:t>
-            </a:r>
-            <a:r>
-              <a:rPr lang="de-DE" dirty="0" err="1"/>
-              <a:t>Steps</a:t>
-            </a:r>
-            <a:endParaRPr lang="de-DE" dirty="0"/>
-          </a:p>
-        </p:txBody>
-      </p:sp>
-      <p:sp>
-        <p:nvSpPr>
-          <p:cNvPr id="4" name="Textplatzhalter 3">
-            <a:extLst>
-              <a:ext uri="{FF2B5EF4-FFF2-40B4-BE49-F238E27FC236}">
-                <a16:creationId xmlns:a16="http://schemas.microsoft.com/office/drawing/2014/main" xmlns="" id="{D339607B-4FC8-4BD1-B47E-73015740EB3C}"/>
-              </a:ext>
-            </a:extLst>
-          </p:cNvPr>
-          <p:cNvSpPr>
-            <a:spLocks noGrp="1"/>
-          </p:cNvSpPr>
-          <p:nvPr>
-            <p:ph type="body" sz="quarter" idx="11"/>
-          </p:nvPr>
-        </p:nvSpPr>
-        <p:spPr>
-          <a:xfrm>
-            <a:off x="335360" y="3861048"/>
-            <a:ext cx="11521280" cy="2232248"/>
-          </a:xfrm>
-        </p:spPr>
-        <p:txBody>
-          <a:bodyPr>
-            <a:normAutofit lnSpcReduction="10000"/>
-          </a:bodyPr>
-          <a:lstStyle/>
-          <a:p>
-            <a:r>
-              <a:rPr lang="en-US" dirty="0" smtClean="0"/>
-              <a:t>Remarks</a:t>
-            </a:r>
-          </a:p>
-          <a:p>
-            <a:pPr lvl="1"/>
-            <a:r>
-              <a:rPr lang="en-US" sz="2000" dirty="0" smtClean="0"/>
-              <a:t>Low Identification of (truncated) country names reflects low presence of countries in randomized addresses -&gt; Network does not expect people to enter countries</a:t>
-            </a:r>
-          </a:p>
-          <a:p>
-            <a:pPr lvl="1"/>
-            <a:r>
-              <a:rPr lang="en-US" sz="2000" dirty="0" smtClean="0"/>
-              <a:t>Low Completion precision of ZIP Codes is not bad (we want the network to generalize address language model)</a:t>
-            </a:r>
-          </a:p>
-          <a:p>
-            <a:pPr lvl="1"/>
-            <a:r>
-              <a:rPr lang="en-US" sz="2000" dirty="0" smtClean="0"/>
-              <a:t>Precision-Recall tradeoff for ROAD class means Network over-expects roads</a:t>
-            </a:r>
-            <a:endParaRPr lang="en-US" sz="2400" dirty="0" smtClean="0"/>
-          </a:p>
-        </p:txBody>
-      </p:sp>
-      <p:graphicFrame>
-        <p:nvGraphicFramePr>
-          <p:cNvPr id="5" name="Table 4"/>
-          <p:cNvGraphicFramePr>
-            <a:graphicFrameLocks noGrp="1"/>
-          </p:cNvGraphicFramePr>
-          <p:nvPr>
-            <p:extLst>
-              <p:ext uri="{D42A27DB-BD31-4B8C-83A1-F6EECF244321}">
-                <p14:modId xmlns:p14="http://schemas.microsoft.com/office/powerpoint/2010/main" val="1827800157"/>
-              </p:ext>
-            </p:extLst>
-          </p:nvPr>
-        </p:nvGraphicFramePr>
-        <p:xfrm>
-          <a:off x="367933" y="1366049"/>
-          <a:ext cx="10945215" cy="2494280"/>
-        </p:xfrm>
-        <a:graphic>
-          <a:graphicData uri="http://schemas.openxmlformats.org/drawingml/2006/table">
-            <a:tbl>
-              <a:tblPr firstRow="1" bandRow="1">
-                <a:tableStyleId>{F5AB1C69-6EDB-4FF4-983F-18BD219EF322}</a:tableStyleId>
-              </a:tblPr>
-              <a:tblGrid>
-                <a:gridCol w="1512168"/>
-                <a:gridCol w="2160240"/>
-                <a:gridCol w="2808312"/>
-                <a:gridCol w="2016224"/>
-                <a:gridCol w="2448271"/>
-              </a:tblGrid>
-              <a:tr h="370840">
-                <a:tc>
-                  <a:txBody>
-                    <a:bodyPr/>
-                    <a:lstStyle/>
-                    <a:p>
-                      <a:r>
-                        <a:rPr lang="en-US" dirty="0" smtClean="0"/>
-                        <a:t>Category</a:t>
-                      </a:r>
-                      <a:endParaRPr lang="en-US" dirty="0"/>
-                    </a:p>
-                  </a:txBody>
-                  <a:tcPr/>
-                </a:tc>
-                <a:tc>
-                  <a:txBody>
-                    <a:bodyPr/>
-                    <a:lstStyle/>
-                    <a:p>
-                      <a:r>
-                        <a:rPr lang="en-US" dirty="0" smtClean="0"/>
-                        <a:t>Identification-Recall</a:t>
-                      </a:r>
-                      <a:endParaRPr lang="en-US" dirty="0"/>
-                    </a:p>
-                  </a:txBody>
-                  <a:tcPr/>
-                </a:tc>
-                <a:tc>
-                  <a:txBody>
-                    <a:bodyPr/>
-                    <a:lstStyle/>
-                    <a:p>
-                      <a:r>
-                        <a:rPr lang="en-US" dirty="0" smtClean="0"/>
-                        <a:t>Identification-Precision</a:t>
-                      </a:r>
-                      <a:endParaRPr lang="en-US" dirty="0"/>
-                    </a:p>
-                  </a:txBody>
-                  <a:tcPr/>
-                </a:tc>
-                <a:tc>
-                  <a:txBody>
-                    <a:bodyPr/>
-                    <a:lstStyle/>
-                    <a:p>
-                      <a:r>
-                        <a:rPr lang="en-US" dirty="0" smtClean="0"/>
-                        <a:t>Identification-F1</a:t>
-                      </a:r>
-                      <a:endParaRPr lang="en-US" dirty="0"/>
-                    </a:p>
-                  </a:txBody>
-                  <a:tcPr/>
-                </a:tc>
-                <a:tc>
-                  <a:txBody>
-                    <a:bodyPr/>
-                    <a:lstStyle/>
-                    <a:p>
-                      <a:r>
-                        <a:rPr lang="en-US" dirty="0" smtClean="0"/>
-                        <a:t>Greedy Completion Precision</a:t>
-                      </a:r>
-                      <a:endParaRPr lang="en-US" dirty="0"/>
-                    </a:p>
-                  </a:txBody>
-                  <a:tcPr/>
-                </a:tc>
-              </a:tr>
-              <a:tr h="370840">
-                <a:tc>
-                  <a:txBody>
-                    <a:bodyPr/>
-                    <a:lstStyle/>
-                    <a:p>
-                      <a:r>
-                        <a:rPr lang="en-US" dirty="0" smtClean="0"/>
-                        <a:t>CITY</a:t>
-                      </a:r>
-                      <a:endParaRPr lang="en-US" dirty="0"/>
-                    </a:p>
-                  </a:txBody>
-                  <a:tcPr/>
-                </a:tc>
-                <a:tc>
-                  <a:txBody>
-                    <a:bodyPr/>
-                    <a:lstStyle/>
-                    <a:p>
-                      <a:r>
-                        <a:rPr lang="en-US" dirty="0" smtClean="0"/>
-                        <a:t>82%</a:t>
-                      </a:r>
-                      <a:endParaRPr lang="en-US" dirty="0"/>
-                    </a:p>
-                  </a:txBody>
-                  <a:tcPr/>
-                </a:tc>
-                <a:tc>
-                  <a:txBody>
-                    <a:bodyPr/>
-                    <a:lstStyle/>
-                    <a:p>
-                      <a:r>
-                        <a:rPr lang="en-US" dirty="0" smtClean="0"/>
-                        <a:t>78%</a:t>
-                      </a:r>
-                      <a:endParaRPr lang="en-US" dirty="0"/>
-                    </a:p>
-                  </a:txBody>
-                  <a:tcPr/>
-                </a:tc>
-                <a:tc>
-                  <a:txBody>
-                    <a:bodyPr/>
-                    <a:lstStyle/>
-                    <a:p>
-                      <a:r>
-                        <a:rPr lang="en-US" dirty="0" smtClean="0"/>
-                        <a:t>80%</a:t>
-                      </a:r>
-                      <a:endParaRPr lang="en-US" dirty="0"/>
-                    </a:p>
-                  </a:txBody>
-                  <a:tcPr/>
-                </a:tc>
-                <a:tc>
-                  <a:txBody>
-                    <a:bodyPr/>
-                    <a:lstStyle/>
-                    <a:p>
-                      <a:r>
-                        <a:rPr lang="en-US" dirty="0" smtClean="0"/>
-                        <a:t>36%</a:t>
-                      </a:r>
-                      <a:endParaRPr lang="en-US" dirty="0"/>
-                    </a:p>
-                  </a:txBody>
-                  <a:tcPr/>
-                </a:tc>
-              </a:tr>
-              <a:tr h="370840">
-                <a:tc>
-                  <a:txBody>
-                    <a:bodyPr/>
-                    <a:lstStyle/>
-                    <a:p>
-                      <a:r>
-                        <a:rPr lang="en-US" dirty="0" smtClean="0"/>
-                        <a:t>ROAD</a:t>
-                      </a:r>
-                      <a:endParaRPr lang="en-US" dirty="0"/>
-                    </a:p>
-                  </a:txBody>
-                  <a:tcPr/>
-                </a:tc>
-                <a:tc>
-                  <a:txBody>
-                    <a:bodyPr/>
-                    <a:lstStyle/>
-                    <a:p>
-                      <a:r>
-                        <a:rPr lang="en-US" dirty="0" smtClean="0"/>
-                        <a:t>94%</a:t>
-                      </a:r>
-                      <a:endParaRPr lang="en-US" dirty="0"/>
-                    </a:p>
-                  </a:txBody>
-                  <a:tcPr/>
-                </a:tc>
-                <a:tc>
-                  <a:txBody>
-                    <a:bodyPr/>
-                    <a:lstStyle/>
-                    <a:p>
-                      <a:r>
-                        <a:rPr lang="en-US" dirty="0" smtClean="0"/>
-                        <a:t>23%</a:t>
-                      </a:r>
-                      <a:endParaRPr lang="en-US" dirty="0"/>
-                    </a:p>
-                  </a:txBody>
-                  <a:tcPr/>
-                </a:tc>
-                <a:tc>
-                  <a:txBody>
-                    <a:bodyPr/>
-                    <a:lstStyle/>
-                    <a:p>
-                      <a:r>
-                        <a:rPr lang="en-US" dirty="0" smtClean="0"/>
-                        <a:t>37%</a:t>
-                      </a:r>
-                      <a:endParaRPr lang="en-US" dirty="0"/>
-                    </a:p>
-                  </a:txBody>
-                  <a:tcPr/>
-                </a:tc>
-                <a:tc>
-                  <a:txBody>
-                    <a:bodyPr/>
-                    <a:lstStyle/>
-                    <a:p>
-                      <a:r>
-                        <a:rPr lang="en-US" dirty="0" smtClean="0"/>
-                        <a:t>31%</a:t>
-                      </a:r>
-                      <a:endParaRPr lang="en-US" dirty="0"/>
-                    </a:p>
-                  </a:txBody>
-                  <a:tcPr/>
-                </a:tc>
-              </a:tr>
-              <a:tr h="370840">
-                <a:tc>
-                  <a:txBody>
-                    <a:bodyPr/>
-                    <a:lstStyle/>
-                    <a:p>
-                      <a:r>
-                        <a:rPr lang="en-US" dirty="0" smtClean="0"/>
-                        <a:t>COUNTRY</a:t>
-                      </a:r>
-                      <a:endParaRPr lang="en-US" dirty="0"/>
-                    </a:p>
-                  </a:txBody>
-                  <a:tcPr/>
-                </a:tc>
-                <a:tc>
-                  <a:txBody>
-                    <a:bodyPr/>
-                    <a:lstStyle/>
-                    <a:p>
-                      <a:r>
-                        <a:rPr lang="en-US" dirty="0" smtClean="0"/>
-                        <a:t>20%</a:t>
-                      </a:r>
-                      <a:endParaRPr lang="en-US" dirty="0"/>
-                    </a:p>
-                  </a:txBody>
-                  <a:tcPr/>
-                </a:tc>
-                <a:tc>
-                  <a:txBody>
-                    <a:bodyPr/>
-                    <a:lstStyle/>
-                    <a:p>
-                      <a:r>
-                        <a:rPr lang="en-US" dirty="0" smtClean="0"/>
-                        <a:t>19%</a:t>
-                      </a:r>
-                      <a:endParaRPr lang="en-US" dirty="0"/>
-                    </a:p>
-                  </a:txBody>
-                  <a:tcPr/>
-                </a:tc>
-                <a:tc>
-                  <a:txBody>
-                    <a:bodyPr/>
-                    <a:lstStyle/>
-                    <a:p>
-                      <a:r>
-                        <a:rPr lang="en-US" dirty="0" smtClean="0"/>
-                        <a:t>19%</a:t>
-                      </a:r>
-                      <a:endParaRPr lang="en-US" dirty="0"/>
-                    </a:p>
-                  </a:txBody>
-                  <a:tcPr/>
-                </a:tc>
-                <a:tc>
-                  <a:txBody>
-                    <a:bodyPr/>
-                    <a:lstStyle/>
-                    <a:p>
-                      <a:r>
-                        <a:rPr lang="en-US" dirty="0" smtClean="0"/>
-                        <a:t>100%</a:t>
-                      </a:r>
-                      <a:endParaRPr lang="en-US" dirty="0"/>
-                    </a:p>
-                  </a:txBody>
-                  <a:tcPr/>
-                </a:tc>
-              </a:tr>
-              <a:tr h="370840">
-                <a:tc>
-                  <a:txBody>
-                    <a:bodyPr/>
-                    <a:lstStyle/>
-                    <a:p>
-                      <a:r>
-                        <a:rPr lang="en-US" dirty="0" smtClean="0"/>
-                        <a:t>STATE</a:t>
-                      </a:r>
-                      <a:endParaRPr lang="en-US" dirty="0"/>
-                    </a:p>
-                  </a:txBody>
-                  <a:tcPr/>
-                </a:tc>
-                <a:tc>
-                  <a:txBody>
-                    <a:bodyPr/>
-                    <a:lstStyle/>
-                    <a:p>
-                      <a:r>
-                        <a:rPr lang="en-US" dirty="0" smtClean="0"/>
-                        <a:t>84%</a:t>
-                      </a:r>
-                      <a:endParaRPr lang="en-US" dirty="0"/>
-                    </a:p>
-                  </a:txBody>
-                  <a:tcPr/>
-                </a:tc>
-                <a:tc>
-                  <a:txBody>
-                    <a:bodyPr/>
-                    <a:lstStyle/>
-                    <a:p>
-                      <a:r>
-                        <a:rPr lang="en-US" dirty="0" smtClean="0"/>
-                        <a:t>65%</a:t>
-                      </a:r>
-                      <a:endParaRPr lang="en-US" dirty="0"/>
-                    </a:p>
-                  </a:txBody>
-                  <a:tcPr/>
-                </a:tc>
-                <a:tc>
-                  <a:txBody>
-                    <a:bodyPr/>
-                    <a:lstStyle/>
-                    <a:p>
-                      <a:r>
-                        <a:rPr lang="en-US" dirty="0" smtClean="0"/>
-                        <a:t>73%</a:t>
-                      </a:r>
-                      <a:endParaRPr lang="en-US" dirty="0"/>
-                    </a:p>
-                  </a:txBody>
-                  <a:tcPr/>
-                </a:tc>
-                <a:tc>
-                  <a:txBody>
-                    <a:bodyPr/>
-                    <a:lstStyle/>
-                    <a:p>
-                      <a:r>
-                        <a:rPr lang="en-US" dirty="0" smtClean="0"/>
-                        <a:t>97%</a:t>
-                      </a:r>
-                      <a:endParaRPr lang="en-US" dirty="0"/>
-                    </a:p>
-                  </a:txBody>
-                  <a:tcPr/>
-                </a:tc>
-              </a:tr>
-              <a:tr h="370840">
-                <a:tc>
-                  <a:txBody>
-                    <a:bodyPr/>
-                    <a:lstStyle/>
-                    <a:p>
-                      <a:r>
-                        <a:rPr lang="en-US" dirty="0" smtClean="0"/>
-                        <a:t>ZIP</a:t>
-                      </a:r>
-                      <a:endParaRPr lang="en-US" dirty="0"/>
-                    </a:p>
-                  </a:txBody>
-                  <a:tcPr/>
-                </a:tc>
-                <a:tc>
-                  <a:txBody>
-                    <a:bodyPr/>
-                    <a:lstStyle/>
-                    <a:p>
-                      <a:r>
-                        <a:rPr lang="en-US" dirty="0" smtClean="0"/>
-                        <a:t>65%</a:t>
-                      </a:r>
-                      <a:endParaRPr lang="en-US" dirty="0"/>
-                    </a:p>
-                  </a:txBody>
-                  <a:tcPr/>
-                </a:tc>
-                <a:tc>
-                  <a:txBody>
-                    <a:bodyPr/>
-                    <a:lstStyle/>
-                    <a:p>
-                      <a:r>
-                        <a:rPr lang="en-US" dirty="0" smtClean="0"/>
-                        <a:t>65%</a:t>
-                      </a:r>
-                      <a:endParaRPr lang="en-US" dirty="0"/>
-                    </a:p>
-                  </a:txBody>
-                  <a:tcPr/>
-                </a:tc>
-                <a:tc>
-                  <a:txBody>
-                    <a:bodyPr/>
-                    <a:lstStyle/>
-                    <a:p>
-                      <a:r>
-                        <a:rPr lang="en-US" dirty="0" smtClean="0"/>
-                        <a:t>65%</a:t>
-                      </a:r>
-                      <a:endParaRPr lang="en-US" dirty="0"/>
-                    </a:p>
-                  </a:txBody>
-                  <a:tcPr/>
-                </a:tc>
-                <a:tc>
-                  <a:txBody>
-                    <a:bodyPr/>
-                    <a:lstStyle/>
-                    <a:p>
-                      <a:r>
-                        <a:rPr lang="en-US" dirty="0" smtClean="0"/>
-                        <a:t>12%</a:t>
-                      </a:r>
-                      <a:endParaRPr lang="en-US" dirty="0"/>
-                    </a:p>
-                  </a:txBody>
-                  <a:tcPr/>
-                </a:tc>
-              </a:tr>
-            </a:tbl>
-          </a:graphicData>
-        </a:graphic>
-      </p:graphicFrame>
-    </p:spTree>
-    <p:extLst>
-      <p:ext uri="{BB962C8B-B14F-4D97-AF65-F5344CB8AC3E}">
-        <p14:creationId xmlns:p14="http://schemas.microsoft.com/office/powerpoint/2010/main" val="185403293"/>
-      </p:ext>
-    </p:extLst>
-  </p:cSld>
-  <p:clrMapOvr>
-    <a:masterClrMapping/>
-  </p:clrMapOvr>
-</p:sld>
-</file>
-
-<file path=ppt/slides/slide11.xml><?xml version="1.0" encoding="utf-8"?>
 <p:sld xmlns:a="http://schemas.openxmlformats.org/drawingml/2006/main" xmlns:r="http://schemas.openxmlformats.org/officeDocument/2006/relationships" xmlns:p="http://schemas.openxmlformats.org/presentationml/2006/main">
   <p:cSld>
     <p:spTree>
@@ -15485,7 +14783,7 @@
             <a:pPr lvl="1"/>
             <a:r>
               <a:rPr lang="en-US" sz="2000" dirty="0" smtClean="0"/>
-              <a:t>Greedy completion precision is measured as percentage of correctly completed characters of last token. </a:t>
+              <a:t>Greedy completion precision is measured as percentage of correctly predicted characters from the truncated postfix. </a:t>
             </a:r>
             <a:r>
               <a:rPr lang="en-US" sz="2000" b="1" dirty="0" smtClean="0"/>
@@ -15506,14 +14804,14 @@
           <p:nvPr>
             <p:extLst>
               <p:ext uri="{D42A27DB-BD31-4B8C-83A1-F6EECF244321}">
-                <p14:modId xmlns:p14="http://schemas.microsoft.com/office/powerpoint/2010/main" val="1806463270"/>
+                <p14:modId xmlns:p14="http://schemas.microsoft.com/office/powerpoint/2010/main" val="98705358"/>
               </p:ext>
             </p:extLst>
           </p:nvPr>
         </p:nvGraphicFramePr>
         <p:xfrm>
           <a:off x="479376" y="3573016"/>
-          <a:ext cx="10945215" cy="2494280"/>
+          <a:ext cx="10945215" cy="2219960"/>
         </p:xfrm>
         <a:graphic>
           <a:graphicData uri="http://schemas.openxmlformats.org/drawingml/2006/table">
@@ -15523,12 +14821,12 @@
               </a:tblPr>
               <a:tblGrid>
                 <a:gridCol w="1512168"/>
-                <a:gridCol w="2160240"/>
-                <a:gridCol w="2808312"/>
-                <a:gridCol w="2016224"/>
-                <a:gridCol w="2448271"/>
+                <a:gridCol w="2448272"/>
+                <a:gridCol w="2088232"/>
+                <a:gridCol w="1800200"/>
+                <a:gridCol w="3096343"/>
               </a:tblGrid>
-              <a:tr h="370840">
+              <a:tr h="360040">
                 <a:tc>
                   <a:txBody>
                     <a:bodyPr/>
@@ -15550,7 +14848,7 @@
                     <a:p>
                       <a:r>
                         <a:rPr lang="en-US" dirty="0" smtClean="0"/>
-                        <a:t>Identification-Recall</a:t>
+                        <a:t>Identification-Precision</a:t>
                       </a:r>
                       <a:endParaRPr lang="en-US" dirty="0"/>
                     </a:p>
@@ -15562,11 +14860,27 @@
                     <a:bodyPr/>
                     <a:lstStyle/>
                     <a:p>
+                      <a:pPr marL="0" marR="0" indent="0" algn="l" defTabSz="914400" rtl="0" eaLnBrk="1" fontAlgn="auto" latinLnBrk="0" hangingPunct="1">
+                        <a:lnSpc>
+                          <a:spcPct val="100000"/>
+                        </a:lnSpc>
+                        <a:spcBef>
+                          <a:spcPts val="0"/>
+                        </a:spcBef>
+                        <a:spcAft>
+                          <a:spcPts val="0"/>
+                        </a:spcAft>
+                        <a:buClrTx/>
+                        <a:buSzTx/>
+                        <a:buFontTx/>
+                        <a:buNone/>
+                        <a:tabLst/>
+                        <a:defRPr/>
+                      </a:pPr>
                       <a:r>
                         <a:rPr lang="en-US" dirty="0" smtClean="0"/>
-                        <a:t>Identification-Precision</a:t>
+                        <a:t>Identification-Recall</a:t>
                       </a:r>
-                      <a:endParaRPr lang="en-US" dirty="0"/>
                     </a:p>
                   </a:txBody>
                   <a:tcPr/>
@@ -15621,8 +14935,34 @@
                     <a:lstStyle/>
                     <a:p>
                       <a:r>
-                        <a:rPr lang="en-US" dirty="0" smtClean="0"/>
-                        <a:t>82%</a:t>
+                        <a:rPr lang="mr-IN" dirty="0" smtClean="0">
+                          <a:latin typeface="Calibri" charset="0"/>
+                          <a:ea typeface="Calibri" charset="0"/>
+                          <a:cs typeface="Calibri" charset="0"/>
+                        </a:rPr>
+                        <a:t>80.3%</a:t>
+                      </a:r>
+                      <a:endParaRPr lang="en-US" dirty="0">
+                        <a:latin typeface="Calibri" charset="0"/>
+                        <a:ea typeface="Calibri" charset="0"/>
+                        <a:cs typeface="Calibri" charset="0"/>
+                      </a:endParaRPr>
+                    </a:p>
+                  </a:txBody>
+                  <a:tcPr/>
+                </a:tc>
+                <a:tc>
+                  <a:txBody>
+                    <a:bodyPr/>
+                    <a:lstStyle/>
+                    <a:p>
+                      <a:r>
+                        <a:rPr lang="mr-IN" dirty="0" smtClean="0">
+                          <a:latin typeface="Calibri" charset="0"/>
+                          <a:ea typeface="Calibri" charset="0"/>
+                          <a:cs typeface="Calibri" charset="0"/>
+                        </a:rPr>
+                        <a:t>91.3%</a:t>
                       </a:r>
                       <a:endParaRPr lang="en-US" dirty="0"/>
                     </a:p>
@@ -15635,8 +14975,20 @@
                     <a:lstStyle/>
                     <a:p>
                       <a:r>
-                        <a:rPr lang="en-US" dirty="0" smtClean="0"/>
-                        <a:t>78%</a:t>
+                        <a:rPr lang="mr-IN" dirty="0" smtClean="0">
+                          <a:latin typeface="Calibri" charset="0"/>
+                          <a:ea typeface="Calibri" charset="0"/>
+                          <a:cs typeface="Calibri" charset="0"/>
+                        </a:rPr>
+                        <a:t>85.5</a:t>
+                      </a:r>
+                      <a:r>
+                        <a:rPr lang="en-US" dirty="0" smtClean="0">
+                          <a:latin typeface="Calibri" charset="0"/>
+                          <a:ea typeface="Calibri" charset="0"/>
+                          <a:cs typeface="Calibri" charset="0"/>
+                        </a:rPr>
+                        <a:t>%</a:t>
                       </a:r>
                       <a:endParaRPr lang="en-US" dirty="0"/>
                     </a:p>
@@ -15649,22 +15001,28 @@
                     <a:lstStyle/>
                     <a:p>
                       <a:r>
-                        <a:rPr lang="en-US" dirty="0" smtClean="0"/>
-                        <a:t>80%</a:t>
+                        <a:rPr lang="mr-IN" dirty="0" smtClean="0">
+                          <a:latin typeface="Calibri" charset="0"/>
+                          <a:ea typeface="Calibri" charset="0"/>
+                          <a:cs typeface="Calibri" charset="0"/>
+                        </a:rPr>
+                        <a:t>61</a:t>
                       </a:r>
-                      <a:endParaRPr lang="en-US" dirty="0"/>
-                    </a:p>
-                  </a:txBody>
-                  <a:tcPr/>
-                </a:tc>
-                <a:tc>
-                  <a:txBody>
-                    <a:bodyPr/>
-                    <a:lstStyle/>
-                    <a:p>
                       <a:r>
-                        <a:rPr lang="en-US" dirty="0" smtClean="0"/>
-                        <a:t>36%</a:t>
+                        <a:rPr lang="en-US" dirty="0" smtClean="0">
+                          <a:latin typeface="Calibri" charset="0"/>
+                          <a:ea typeface="Calibri" charset="0"/>
+                          <a:cs typeface="Calibri" charset="0"/>
+                        </a:rPr>
+                        <a:t>.</a:t>
+                      </a:r>
+                      <a:r>
+                        <a:rPr lang="mr-IN" dirty="0" smtClean="0">
+                          <a:latin typeface="Calibri" charset="0"/>
+                          <a:ea typeface="Calibri" charset="0"/>
+                          <a:cs typeface="Calibri" charset="0"/>
+                        </a:rPr>
+                        <a:t>0%</a:t>
                       </a:r>
                       <a:endParaRPr lang="en-US" dirty="0"/>
                     </a:p>
@@ -15693,8 +15051,42 @@
                     <a:lstStyle/>
                     <a:p>
                       <a:r>
-                        <a:rPr lang="en-US" dirty="0" smtClean="0"/>
-                        <a:t>94%</a:t>
+                        <a:rPr lang="mr-IN" dirty="0" smtClean="0">
+                          <a:latin typeface="Calibri" charset="0"/>
+                          <a:ea typeface="Calibri" charset="0"/>
+                          <a:cs typeface="Calibri" charset="0"/>
+                        </a:rPr>
+                        <a:t>87.3%</a:t>
+                      </a:r>
+                      <a:endParaRPr lang="en-US" dirty="0">
+                        <a:latin typeface="Calibri" charset="0"/>
+                        <a:ea typeface="Calibri" charset="0"/>
+                        <a:cs typeface="Calibri" charset="0"/>
+                      </a:endParaRPr>
+                    </a:p>
+                  </a:txBody>
+                  <a:tcPr/>
+                </a:tc>
+                <a:tc>
+                  <a:txBody>
+                    <a:bodyPr/>
+                    <a:lstStyle/>
+                    <a:p>
+                      <a:r>
+                        <a:rPr lang="mr-IN" dirty="0" smtClean="0">
+                          <a:latin typeface="Calibri" charset="0"/>
+                          <a:ea typeface="Calibri" charset="0"/>
+                          <a:cs typeface="Calibri" charset="0"/>
+                        </a:rPr>
+                        <a:t>92.9</a:t>
+                      </a:r>
+                      <a:r>
+                        <a:rPr lang="en-US" dirty="0" smtClean="0">
+                          <a:latin typeface="Calibri" charset="0"/>
+                          <a:ea typeface="Calibri" charset="0"/>
+                          <a:cs typeface="Calibri" charset="0"/>
+                        </a:rPr>
+                        <a:t>%</a:t>
                       </a:r>
                       <a:endParaRPr lang="en-US" dirty="0"/>
                     </a:p>
@@ -15707,8 +15099,12 @@
                     <a:lstStyle/>
                     <a:p>
                       <a:r>
-                        <a:rPr lang="en-US" dirty="0" smtClean="0"/>
-                        <a:t>23%</a:t>
+                        <a:rPr lang="mr-IN" dirty="0" smtClean="0">
+                          <a:latin typeface="Calibri" charset="0"/>
+                          <a:ea typeface="Calibri" charset="0"/>
+                          <a:cs typeface="Calibri" charset="0"/>
+                        </a:rPr>
+                        <a:t>90.0%</a:t>
                       </a:r>
                       <a:endParaRPr lang="en-US" dirty="0"/>
                     </a:p>
@@ -15721,94 +15117,28 @@
                     <a:lstStyle/>
                     <a:p>
                       <a:r>
-                        <a:rPr lang="en-US" dirty="0" smtClean="0"/>
-                        <a:t>37%</a:t>
+                        <a:rPr lang="mr-IN" dirty="0" smtClean="0">
+                          <a:latin typeface="Calibri" charset="0"/>
+                          <a:ea typeface="Calibri" charset="0"/>
+                          <a:cs typeface="Calibri" charset="0"/>
+                        </a:rPr>
+                        <a:t>34</a:t>
                       </a:r>
-                      <a:endParaRPr lang="en-US" dirty="0"/>
-                    </a:p>
-                  </a:txBody>
-                  <a:tcPr/>
-                </a:tc>
-                <a:tc>
-                  <a:txBody>
-                    <a:bodyPr/>
-                    <a:lstStyle/>
-                    <a:p>
                       <a:r>
-                        <a:rPr lang="en-US" dirty="0" smtClean="0"/>
-                        <a:t>31%</a:t>
+                        <a:rPr lang="en-US" dirty="0" smtClean="0">
+                          <a:latin typeface="Calibri" charset="0"/>
+                          <a:ea typeface="Calibri" charset="0"/>
+                          <a:cs typeface="Calibri" charset="0"/>
+                        </a:rPr>
+                        <a:t>.</a:t>
                       </a:r>
-                      <a:endParaRPr lang="en-US" dirty="0"/>
-                    </a:p>
-                  </a:txBody>
-                  <a:tcPr/>
-                </a:tc>
-              </a:tr>
-              <a:tr h="370840">
-                <a:tc>
-                  <a:txBody>
-                    <a:bodyPr/>
-                    <a:lstStyle/>
-                    <a:p>
                       <a:r>
-                        <a:rPr lang="en-US" dirty="0" smtClean="0"/>
-                        <a:t>COUNTRY</a:t>
-                      </a:r>
-                      <a:endParaRPr lang="en-US" dirty="0"/>
-                    </a:p>
-                  </a:txBody>
-                  <a:tcPr/>
-                </a:tc>
-                <a:tc>
-                  <a:txBody>
-                    <a:bodyPr/>
-                    <a:lstStyle/>
-                    <a:p>
-                      <a:r>
-                        <a:rPr lang="en-US" dirty="0" smtClean="0"/>
-                        <a:t>20%</a:t>
-                      </a:r>
-                      <a:endParaRPr lang="en-US" dirty="0"/>
-                    </a:p>
-                  </a:txBody>
-                  <a:tcPr/>
-                </a:tc>
-                <a:tc>
-                  <a:txBody>
-                    <a:bodyPr/>
-                    <a:lstStyle/>
-                    <a:p>
-                      <a:r>
-                        <a:rPr lang="en-US" dirty="0" smtClean="0"/>
-                        <a:t>19%</a:t>
-                      </a:r>
-                      <a:endParaRPr lang="en-US" dirty="0"/>
-                    </a:p>
-                  </a:txBody>
-                  <a:tcPr/>
-                </a:tc>
-                <a:tc>
-                  <a:txBody>
-                    <a:bodyPr/>
-                    <a:lstStyle/>
-                    <a:p>
-                      <a:r>
-                        <a:rPr lang="en-US" dirty="0" smtClean="0"/>
-                        <a:t>19%</a:t>
-                      </a:r>
-                      <a:endParaRPr lang="en-US" dirty="0"/>
-                    </a:p>
-                  </a:txBody>
-                  <a:tcPr/>
-                </a:tc>
-                <a:tc>
-                  <a:txBody>
-                    <a:bodyPr/>
-                    <a:lstStyle/>
-                    <a:p>
-                      <a:r>
-                        <a:rPr lang="en-US" dirty="0" smtClean="0"/>
-                        <a:t>100%</a:t>
+                        <a:rPr lang="mr-IN" dirty="0" smtClean="0">
+                          <a:latin typeface="Calibri" charset="0"/>
+                          <a:ea typeface="Calibri" charset="0"/>
+                          <a:cs typeface="Calibri" charset="0"/>
+                        </a:rPr>
+                        <a:t>0%</a:t>
                       </a:r>
                       <a:endParaRPr lang="en-US" dirty="0"/>
                     </a:p>
@@ -15837,8 +15167,120 @@
                     <a:lstStyle/>
                     <a:p>
                       <a:r>
+                        <a:rPr lang="mr-IN" dirty="0" smtClean="0">
+                          <a:latin typeface="Calibri" charset="0"/>
+                          <a:ea typeface="Calibri" charset="0"/>
+                          <a:cs typeface="Calibri" charset="0"/>
+                        </a:rPr>
+                        <a:t>82.4%</a:t>
+                      </a:r>
+                      <a:endParaRPr lang="en-US" dirty="0">
+                        <a:latin typeface="Calibri" charset="0"/>
+                        <a:ea typeface="Calibri" charset="0"/>
+                        <a:cs typeface="Calibri" charset="0"/>
+                      </a:endParaRPr>
+                    </a:p>
+                  </a:txBody>
+                  <a:tcPr/>
+                </a:tc>
+                <a:tc>
+                  <a:txBody>
+                    <a:bodyPr/>
+                    <a:lstStyle/>
+                    <a:p>
+                      <a:r>
+                        <a:rPr lang="mr-IN" dirty="0" smtClean="0">
+                          <a:latin typeface="Calibri" charset="0"/>
+                          <a:ea typeface="Calibri" charset="0"/>
+                          <a:cs typeface="Calibri" charset="0"/>
+                        </a:rPr>
+                        <a:t>87.5%</a:t>
+                      </a:r>
+                      <a:endParaRPr lang="en-US" dirty="0"/>
+                    </a:p>
+                  </a:txBody>
+                  <a:tcPr/>
+                </a:tc>
+                <a:tc>
+                  <a:txBody>
+                    <a:bodyPr/>
+                    <a:lstStyle/>
+                    <a:p>
+                      <a:pPr marL="0" marR="0" indent="0" algn="l" defTabSz="914400" rtl="0" eaLnBrk="1" fontAlgn="auto" latinLnBrk="0" hangingPunct="1">
+                        <a:lnSpc>
+                          <a:spcPct val="100000"/>
+                        </a:lnSpc>
+                        <a:spcBef>
+                          <a:spcPts val="0"/>
+                        </a:spcBef>
+                        <a:spcAft>
+                          <a:spcPts val="0"/>
+                        </a:spcAft>
+                        <a:buClrTx/>
+                        <a:buSzTx/>
+                        <a:buFontTx/>
+                        <a:buNone/>
+                        <a:tabLst/>
+                        <a:defRPr/>
+                      </a:pPr>
+                      <a:r>
+                        <a:rPr lang="mr-IN" dirty="0" smtClean="0">
+                          <a:latin typeface="Calibri" charset="0"/>
+                          <a:ea typeface="Calibri" charset="0"/>
+                          <a:cs typeface="Calibri" charset="0"/>
+                        </a:rPr>
+                        <a:t>84.9%</a:t>
+                      </a:r>
+                      <a:endParaRPr lang="en-US" dirty="0"/>
+                    </a:p>
+                  </a:txBody>
+                  <a:tcPr/>
+                </a:tc>
+                <a:tc>
+                  <a:txBody>
+                    <a:bodyPr/>
+                    <a:lstStyle/>
+                    <a:p>
+                      <a:pPr marL="0" marR="0" indent="0" algn="l" defTabSz="914400" rtl="0" eaLnBrk="1" fontAlgn="auto" latinLnBrk="0" hangingPunct="1">
+                        <a:lnSpc>
+                          <a:spcPct val="100000"/>
+                        </a:lnSpc>
+                        <a:spcBef>
+                          <a:spcPts val="0"/>
+                        </a:spcBef>
+                        <a:spcAft>
+                          <a:spcPts val="0"/>
+                        </a:spcAft>
+                        <a:buClrTx/>
+                        <a:buSzTx/>
+                        <a:buFontTx/>
+                        <a:buNone/>
+                        <a:tabLst/>
+                        <a:defRPr/>
+                      </a:pPr>
+                      <a:r>
+                        <a:rPr lang="mr-IN" dirty="0" smtClean="0">
+                          <a:latin typeface="Calibri" charset="0"/>
+                          <a:ea typeface="Calibri" charset="0"/>
+                          <a:cs typeface="Calibri" charset="0"/>
+                        </a:rPr>
+                        <a:t>94.2%</a:t>
+                      </a:r>
+                      <a:endParaRPr lang="en-US" dirty="0" smtClean="0"/>
+                    </a:p>
+                  </a:txBody>
+                  <a:tcPr/>
+                </a:tc>
+              </a:tr>
+              <a:tr h="370840">
+                <a:tc>
+                  <a:txBody>
+                    <a:bodyPr/>
+                    <a:lstStyle/>
+                    <a:p>
+                      <a:r>
                         <a:rPr lang="en-US" dirty="0" smtClean="0"/>
-                        <a:t>84%</a:t>
+                        <a:t>COUNTRY</a:t>
                       </a:r>
                       <a:endParaRPr lang="en-US" dirty="0"/>
                     </a:p>
@@ -15851,8 +15293,34 @@
                     <a:lstStyle/>
                     <a:p>
                       <a:r>
-                        <a:rPr lang="en-US" dirty="0" smtClean="0"/>
-                        <a:t>65%</a:t>
+                        <a:rPr lang="mr-IN" dirty="0" smtClean="0">
+                          <a:latin typeface="Calibri" charset="0"/>
+                          <a:ea typeface="Calibri" charset="0"/>
+                          <a:cs typeface="Calibri" charset="0"/>
+                        </a:rPr>
+                        <a:t>84.5%</a:t>
+                      </a:r>
+                      <a:endParaRPr lang="en-US" dirty="0">
+                        <a:latin typeface="Calibri" charset="0"/>
+                        <a:ea typeface="Calibri" charset="0"/>
+                        <a:cs typeface="Calibri" charset="0"/>
+                      </a:endParaRPr>
+                    </a:p>
+                  </a:txBody>
+                  <a:tcPr/>
+                </a:tc>
+                <a:tc>
+                  <a:txBody>
+                    <a:bodyPr/>
+                    <a:lstStyle/>
+                    <a:p>
+                      <a:r>
+                        <a:rPr lang="mr-IN" dirty="0" smtClean="0">
+                          <a:latin typeface="Calibri" charset="0"/>
+                          <a:ea typeface="Calibri" charset="0"/>
+                          <a:cs typeface="Calibri" charset="0"/>
+                        </a:rPr>
+                        <a:t>87.3%</a:t>
                       </a:r>
                       <a:endParaRPr lang="en-US" dirty="0"/>
                     </a:p>
@@ -15865,8 +15333,12 @@
                     <a:lstStyle/>
                     <a:p>
                       <a:r>
-                        <a:rPr lang="en-US" dirty="0" smtClean="0"/>
-                        <a:t>73%</a:t>
+                        <a:rPr lang="mr-IN" dirty="0" smtClean="0">
+                          <a:latin typeface="Calibri" charset="0"/>
+                          <a:ea typeface="Calibri" charset="0"/>
+                          <a:cs typeface="Calibri" charset="0"/>
+                        </a:rPr>
+                        <a:t>85.9%</a:t>
                       </a:r>
                       <a:endParaRPr lang="en-US" dirty="0"/>
                     </a:p>
@@ -15879,8 +15351,12 @@
                     <a:lstStyle/>
                     <a:p>
                       <a:r>
-                        <a:rPr lang="en-US" dirty="0" smtClean="0"/>
-                        <a:t>97%</a:t>
+                        <a:rPr lang="mr-IN" dirty="0" smtClean="0">
+                          <a:latin typeface="Calibri" charset="0"/>
+                          <a:ea typeface="Calibri" charset="0"/>
+                          <a:cs typeface="Calibri" charset="0"/>
+                        </a:rPr>
+                        <a:t>99.9%</a:t>
                       </a:r>
                       <a:endParaRPr lang="en-US" dirty="0"/>
                     </a:p>
@@ -15909,8 +15385,34 @@
                     <a:lstStyle/>
                     <a:p>
                       <a:r>
-                        <a:rPr lang="en-US" dirty="0" smtClean="0"/>
-                        <a:t>65%</a:t>
+                        <a:rPr lang="mr-IN" dirty="0" smtClean="0">
+                          <a:latin typeface="Calibri" charset="0"/>
+                          <a:ea typeface="Calibri" charset="0"/>
+                          <a:cs typeface="Calibri" charset="0"/>
+                        </a:rPr>
+                        <a:t>61.4%</a:t>
+                      </a:r>
+                      <a:endParaRPr lang="en-US" dirty="0">
+                        <a:latin typeface="Calibri" charset="0"/>
+                        <a:ea typeface="Calibri" charset="0"/>
+                        <a:cs typeface="Calibri" charset="0"/>
+                      </a:endParaRPr>
+                    </a:p>
+                  </a:txBody>
+                  <a:tcPr/>
+                </a:tc>
+                <a:tc>
+                  <a:txBody>
+                    <a:bodyPr/>
+                    <a:lstStyle/>
+                    <a:p>
+                      <a:r>
+                        <a:rPr lang="mr-IN" dirty="0" smtClean="0">
+                          <a:latin typeface="Calibri" charset="0"/>
+                          <a:ea typeface="Calibri" charset="0"/>
+                          <a:cs typeface="Calibri" charset="0"/>
+                        </a:rPr>
+                        <a:t>61.5%</a:t>
                       </a:r>
                       <a:endParaRPr lang="en-US" dirty="0"/>
                     </a:p>
@@ -15923,8 +15425,12 @@
                     <a:lstStyle/>
                     <a:p>
                       <a:r>
-                        <a:rPr lang="en-US" dirty="0" smtClean="0"/>
-                        <a:t>65%</a:t>
+                        <a:rPr lang="mr-IN" dirty="0" smtClean="0">
+                          <a:latin typeface="Calibri" charset="0"/>
+                          <a:ea typeface="Calibri" charset="0"/>
+                          <a:cs typeface="Calibri" charset="0"/>
+                        </a:rPr>
+                        <a:t>61.4%</a:t>
                       </a:r>
                       <a:endParaRPr lang="en-US" dirty="0"/>
                     </a:p>
@@ -15937,22 +15443,12 @@
                     <a:lstStyle/>
                     <a:p>
                       <a:r>
-                        <a:rPr lang="en-US" dirty="0" smtClean="0"/>
-                        <a:t>65%</a:t>
-                      </a:r>
-                      <a:endParaRPr lang="en-US" dirty="0"/>
-                    </a:p>
-                  </a:txBody>
-                  <a:tcPr/>
-                </a:tc>
-                <a:tc>
-                  <a:txBody>
-                    <a:bodyPr/>
-                    <a:lstStyle/>
-                    <a:p>
-                      <a:r>
-                        <a:rPr lang="en-US" dirty="0" smtClean="0"/>
-                        <a:t>12%</a:t>
+                        <a:rPr lang="mr-IN" dirty="0" smtClean="0">
+                          <a:latin typeface="Calibri" charset="0"/>
+                          <a:ea typeface="Calibri" charset="0"/>
+                          <a:cs typeface="Calibri" charset="0"/>
+                        </a:rPr>
+                        <a:t>15.9%</a:t>
                       </a:r>
                       <a:endParaRPr lang="en-US" dirty="0"/>
                     </a:p>

</xml_diff>